<commit_message>
netflix.pptx - layout4.png add
</commit_message>
<xml_diff>
--- a/netflix.pptx
+++ b/netflix.pptx
@@ -8,6 +8,7 @@
     <p:sldId id="257" r:id="rId2"/>
     <p:sldId id="258" r:id="rId3"/>
     <p:sldId id="259" r:id="rId4"/>
+    <p:sldId id="260" r:id="rId5"/>
   </p:sldIdLst>
   <p:sldSz cx="12192000" cy="6858000"/>
   <p:notesSz cx="6858000" cy="9144000"/>
@@ -261,7 +262,7 @@
           <a:p>
             <a:fld id="{C4412956-4E19-4F42-8A7C-E89299D1EBAE}" type="datetimeFigureOut">
               <a:rPr lang="ko-KR" altLang="en-US" smtClean="0"/>
-              <a:t>2021-04-05</a:t>
+              <a:t>2021-04-06</a:t>
             </a:fld>
             <a:endParaRPr lang="ko-KR" altLang="en-US"/>
           </a:p>
@@ -459,7 +460,7 @@
           <a:p>
             <a:fld id="{C4412956-4E19-4F42-8A7C-E89299D1EBAE}" type="datetimeFigureOut">
               <a:rPr lang="ko-KR" altLang="en-US" smtClean="0"/>
-              <a:t>2021-04-05</a:t>
+              <a:t>2021-04-06</a:t>
             </a:fld>
             <a:endParaRPr lang="ko-KR" altLang="en-US"/>
           </a:p>
@@ -667,7 +668,7 @@
           <a:p>
             <a:fld id="{C4412956-4E19-4F42-8A7C-E89299D1EBAE}" type="datetimeFigureOut">
               <a:rPr lang="ko-KR" altLang="en-US" smtClean="0"/>
-              <a:t>2021-04-05</a:t>
+              <a:t>2021-04-06</a:t>
             </a:fld>
             <a:endParaRPr lang="ko-KR" altLang="en-US"/>
           </a:p>
@@ -865,7 +866,7 @@
           <a:p>
             <a:fld id="{C4412956-4E19-4F42-8A7C-E89299D1EBAE}" type="datetimeFigureOut">
               <a:rPr lang="ko-KR" altLang="en-US" smtClean="0"/>
-              <a:t>2021-04-05</a:t>
+              <a:t>2021-04-06</a:t>
             </a:fld>
             <a:endParaRPr lang="ko-KR" altLang="en-US"/>
           </a:p>
@@ -1140,7 +1141,7 @@
           <a:p>
             <a:fld id="{C4412956-4E19-4F42-8A7C-E89299D1EBAE}" type="datetimeFigureOut">
               <a:rPr lang="ko-KR" altLang="en-US" smtClean="0"/>
-              <a:t>2021-04-05</a:t>
+              <a:t>2021-04-06</a:t>
             </a:fld>
             <a:endParaRPr lang="ko-KR" altLang="en-US"/>
           </a:p>
@@ -1405,7 +1406,7 @@
           <a:p>
             <a:fld id="{C4412956-4E19-4F42-8A7C-E89299D1EBAE}" type="datetimeFigureOut">
               <a:rPr lang="ko-KR" altLang="en-US" smtClean="0"/>
-              <a:t>2021-04-05</a:t>
+              <a:t>2021-04-06</a:t>
             </a:fld>
             <a:endParaRPr lang="ko-KR" altLang="en-US"/>
           </a:p>
@@ -1817,7 +1818,7 @@
           <a:p>
             <a:fld id="{C4412956-4E19-4F42-8A7C-E89299D1EBAE}" type="datetimeFigureOut">
               <a:rPr lang="ko-KR" altLang="en-US" smtClean="0"/>
-              <a:t>2021-04-05</a:t>
+              <a:t>2021-04-06</a:t>
             </a:fld>
             <a:endParaRPr lang="ko-KR" altLang="en-US"/>
           </a:p>
@@ -1958,7 +1959,7 @@
           <a:p>
             <a:fld id="{C4412956-4E19-4F42-8A7C-E89299D1EBAE}" type="datetimeFigureOut">
               <a:rPr lang="ko-KR" altLang="en-US" smtClean="0"/>
-              <a:t>2021-04-05</a:t>
+              <a:t>2021-04-06</a:t>
             </a:fld>
             <a:endParaRPr lang="ko-KR" altLang="en-US"/>
           </a:p>
@@ -2071,7 +2072,7 @@
           <a:p>
             <a:fld id="{C4412956-4E19-4F42-8A7C-E89299D1EBAE}" type="datetimeFigureOut">
               <a:rPr lang="ko-KR" altLang="en-US" smtClean="0"/>
-              <a:t>2021-04-05</a:t>
+              <a:t>2021-04-06</a:t>
             </a:fld>
             <a:endParaRPr lang="ko-KR" altLang="en-US"/>
           </a:p>
@@ -2382,7 +2383,7 @@
           <a:p>
             <a:fld id="{C4412956-4E19-4F42-8A7C-E89299D1EBAE}" type="datetimeFigureOut">
               <a:rPr lang="ko-KR" altLang="en-US" smtClean="0"/>
-              <a:t>2021-04-05</a:t>
+              <a:t>2021-04-06</a:t>
             </a:fld>
             <a:endParaRPr lang="ko-KR" altLang="en-US"/>
           </a:p>
@@ -2670,7 +2671,7 @@
           <a:p>
             <a:fld id="{C4412956-4E19-4F42-8A7C-E89299D1EBAE}" type="datetimeFigureOut">
               <a:rPr lang="ko-KR" altLang="en-US" smtClean="0"/>
-              <a:t>2021-04-05</a:t>
+              <a:t>2021-04-06</a:t>
             </a:fld>
             <a:endParaRPr lang="ko-KR" altLang="en-US"/>
           </a:p>
@@ -2911,7 +2912,7 @@
           <a:p>
             <a:fld id="{C4412956-4E19-4F42-8A7C-E89299D1EBAE}" type="datetimeFigureOut">
               <a:rPr lang="ko-KR" altLang="en-US" smtClean="0"/>
-              <a:t>2021-04-05</a:t>
+              <a:t>2021-04-06</a:t>
             </a:fld>
             <a:endParaRPr lang="ko-KR" altLang="en-US"/>
           </a:p>
@@ -5687,6 +5688,368 @@
 </p:sld>
 </file>
 
+<file path=ppt/slides/slide4.xml><?xml version="1.0" encoding="utf-8"?>
+<p:sld xmlns:a="http://schemas.openxmlformats.org/drawingml/2006/main" xmlns:r="http://schemas.openxmlformats.org/officeDocument/2006/relationships" xmlns:p="http://schemas.openxmlformats.org/presentationml/2006/main">
+  <p:cSld>
+    <p:spTree>
+      <p:nvGrpSpPr>
+        <p:cNvPr id="1" name=""/>
+        <p:cNvGrpSpPr/>
+        <p:nvPr/>
+      </p:nvGrpSpPr>
+      <p:grpSpPr>
+        <a:xfrm>
+          <a:off x="0" y="0"/>
+          <a:ext cx="0" cy="0"/>
+          <a:chOff x="0" y="0"/>
+          <a:chExt cx="0" cy="0"/>
+        </a:xfrm>
+      </p:grpSpPr>
+      <p:pic>
+        <p:nvPicPr>
+          <p:cNvPr id="3" name="그림 2" descr="텍스트이(가) 표시된 사진&#10;&#10;자동 생성된 설명">
+            <a:extLst>
+              <a:ext uri="{FF2B5EF4-FFF2-40B4-BE49-F238E27FC236}">
+                <a16:creationId xmlns:a16="http://schemas.microsoft.com/office/drawing/2014/main" id="{A5CD86FB-A100-4339-9340-A377E0030CC5}"/>
+              </a:ext>
+            </a:extLst>
+          </p:cNvPr>
+          <p:cNvPicPr>
+            <a:picLocks noChangeAspect="1"/>
+          </p:cNvPicPr>
+          <p:nvPr/>
+        </p:nvPicPr>
+        <p:blipFill>
+          <a:blip r:embed="rId2">
+            <a:extLst>
+              <a:ext uri="{28A0092B-C50C-407E-A947-70E740481C1C}">
+                <a14:useLocalDpi xmlns:a14="http://schemas.microsoft.com/office/drawing/2010/main" val="0"/>
+              </a:ext>
+            </a:extLst>
+          </a:blip>
+          <a:stretch>
+            <a:fillRect/>
+          </a:stretch>
+        </p:blipFill>
+        <p:spPr>
+          <a:xfrm>
+            <a:off x="165100" y="1378227"/>
+            <a:ext cx="11878636" cy="3333474"/>
+          </a:xfrm>
+          <a:prstGeom prst="rect">
+            <a:avLst/>
+          </a:prstGeom>
+        </p:spPr>
+      </p:pic>
+      <p:sp>
+        <p:nvSpPr>
+          <p:cNvPr id="4" name="TextBox 3">
+            <a:extLst>
+              <a:ext uri="{FF2B5EF4-FFF2-40B4-BE49-F238E27FC236}">
+                <a16:creationId xmlns:a16="http://schemas.microsoft.com/office/drawing/2014/main" id="{65130AF6-6C80-41AF-BACE-845098D82A6C}"/>
+              </a:ext>
+            </a:extLst>
+          </p:cNvPr>
+          <p:cNvSpPr txBox="1"/>
+          <p:nvPr/>
+        </p:nvSpPr>
+        <p:spPr>
+          <a:xfrm>
+            <a:off x="3763373" y="1506924"/>
+            <a:ext cx="1657335" cy="523220"/>
+          </a:xfrm>
+          <a:prstGeom prst="rect">
+            <a:avLst/>
+          </a:prstGeom>
+          <a:solidFill>
+            <a:schemeClr val="bg1"/>
+          </a:solidFill>
+        </p:spPr>
+        <p:txBody>
+          <a:bodyPr wrap="square" rtlCol="0">
+            <a:spAutoFit/>
+          </a:bodyPr>
+          <a:lstStyle/>
+          <a:p>
+            <a:r>
+              <a:rPr lang="en-US" altLang="ko-KR" sz="1400" b="1" dirty="0"/>
+              <a:t>Footer</a:t>
+            </a:r>
+          </a:p>
+          <a:p>
+            <a:r>
+              <a:rPr lang="en-US" altLang="ko-KR" sz="1400" b="1" dirty="0"/>
+              <a:t>.footer</a:t>
+            </a:r>
+            <a:endParaRPr lang="ko-KR" altLang="en-US" sz="1400" b="1" dirty="0"/>
+          </a:p>
+        </p:txBody>
+      </p:sp>
+      <p:cxnSp>
+        <p:nvCxnSpPr>
+          <p:cNvPr id="5" name="직선 화살표 연결선 4">
+            <a:extLst>
+              <a:ext uri="{FF2B5EF4-FFF2-40B4-BE49-F238E27FC236}">
+                <a16:creationId xmlns:a16="http://schemas.microsoft.com/office/drawing/2014/main" id="{9A5E2E60-E903-451F-9E3C-63842FEED76A}"/>
+              </a:ext>
+            </a:extLst>
+          </p:cNvPr>
+          <p:cNvCxnSpPr>
+            <a:cxnSpLocks/>
+          </p:cNvCxnSpPr>
+          <p:nvPr/>
+        </p:nvCxnSpPr>
+        <p:spPr>
+          <a:xfrm>
+            <a:off x="4532812" y="2030144"/>
+            <a:ext cx="0" cy="355247"/>
+          </a:xfrm>
+          <a:prstGeom prst="straightConnector1">
+            <a:avLst/>
+          </a:prstGeom>
+          <a:ln w="28575">
+            <a:solidFill>
+              <a:srgbClr val="00B0F0"/>
+            </a:solidFill>
+            <a:tailEnd type="triangle"/>
+          </a:ln>
+        </p:spPr>
+        <p:style>
+          <a:lnRef idx="1">
+            <a:schemeClr val="accent1"/>
+          </a:lnRef>
+          <a:fillRef idx="0">
+            <a:schemeClr val="accent1"/>
+          </a:fillRef>
+          <a:effectRef idx="0">
+            <a:schemeClr val="accent1"/>
+          </a:effectRef>
+          <a:fontRef idx="minor">
+            <a:schemeClr val="tx1"/>
+          </a:fontRef>
+        </p:style>
+      </p:cxnSp>
+      <p:sp>
+        <p:nvSpPr>
+          <p:cNvPr id="9" name="TextBox 8">
+            <a:extLst>
+              <a:ext uri="{FF2B5EF4-FFF2-40B4-BE49-F238E27FC236}">
+                <a16:creationId xmlns:a16="http://schemas.microsoft.com/office/drawing/2014/main" id="{BA80CC01-4C81-4610-AD18-9A305562369B}"/>
+              </a:ext>
+            </a:extLst>
+          </p:cNvPr>
+          <p:cNvSpPr txBox="1"/>
+          <p:nvPr/>
+        </p:nvSpPr>
+        <p:spPr>
+          <a:xfrm>
+            <a:off x="548326" y="2216114"/>
+            <a:ext cx="400034" cy="338554"/>
+          </a:xfrm>
+          <a:prstGeom prst="rect">
+            <a:avLst/>
+          </a:prstGeom>
+          <a:solidFill>
+            <a:schemeClr val="bg1"/>
+          </a:solidFill>
+        </p:spPr>
+        <p:txBody>
+          <a:bodyPr wrap="square" rtlCol="0">
+            <a:spAutoFit/>
+          </a:bodyPr>
+          <a:lstStyle/>
+          <a:p>
+            <a:r>
+              <a:rPr lang="en-US" altLang="ko-KR" sz="1600" b="1" dirty="0"/>
+              <a:t>P</a:t>
+            </a:r>
+            <a:endParaRPr lang="ko-KR" altLang="en-US" sz="1600" b="1" dirty="0"/>
+          </a:p>
+        </p:txBody>
+      </p:sp>
+      <p:cxnSp>
+        <p:nvCxnSpPr>
+          <p:cNvPr id="10" name="직선 화살표 연결선 9">
+            <a:extLst>
+              <a:ext uri="{FF2B5EF4-FFF2-40B4-BE49-F238E27FC236}">
+                <a16:creationId xmlns:a16="http://schemas.microsoft.com/office/drawing/2014/main" id="{349D8E0C-A826-4481-AD80-451A387CD498}"/>
+              </a:ext>
+            </a:extLst>
+          </p:cNvPr>
+          <p:cNvCxnSpPr>
+            <a:cxnSpLocks/>
+          </p:cNvCxnSpPr>
+          <p:nvPr/>
+        </p:nvCxnSpPr>
+        <p:spPr>
+          <a:xfrm>
+            <a:off x="948360" y="2385391"/>
+            <a:ext cx="734666" cy="130153"/>
+          </a:xfrm>
+          <a:prstGeom prst="straightConnector1">
+            <a:avLst/>
+          </a:prstGeom>
+          <a:ln w="28575">
+            <a:solidFill>
+              <a:srgbClr val="00B0F0"/>
+            </a:solidFill>
+            <a:tailEnd type="triangle"/>
+          </a:ln>
+        </p:spPr>
+        <p:style>
+          <a:lnRef idx="1">
+            <a:schemeClr val="accent1"/>
+          </a:lnRef>
+          <a:fillRef idx="0">
+            <a:schemeClr val="accent1"/>
+          </a:fillRef>
+          <a:effectRef idx="0">
+            <a:schemeClr val="accent1"/>
+          </a:effectRef>
+          <a:fontRef idx="minor">
+            <a:schemeClr val="tx1"/>
+          </a:fontRef>
+        </p:style>
+      </p:cxnSp>
+      <p:sp>
+        <p:nvSpPr>
+          <p:cNvPr id="14" name="TextBox 13">
+            <a:extLst>
+              <a:ext uri="{FF2B5EF4-FFF2-40B4-BE49-F238E27FC236}">
+                <a16:creationId xmlns:a16="http://schemas.microsoft.com/office/drawing/2014/main" id="{183D2BA5-2C0C-455D-8725-98A3E7DD14D1}"/>
+              </a:ext>
+            </a:extLst>
+          </p:cNvPr>
+          <p:cNvSpPr txBox="1"/>
+          <p:nvPr/>
+        </p:nvSpPr>
+        <p:spPr>
+          <a:xfrm>
+            <a:off x="10632116" y="3167390"/>
+            <a:ext cx="1394784" cy="523220"/>
+          </a:xfrm>
+          <a:prstGeom prst="rect">
+            <a:avLst/>
+          </a:prstGeom>
+          <a:solidFill>
+            <a:schemeClr val="bg1"/>
+          </a:solidFill>
+        </p:spPr>
+        <p:txBody>
+          <a:bodyPr wrap="square" rtlCol="0">
+            <a:spAutoFit/>
+          </a:bodyPr>
+          <a:lstStyle/>
+          <a:p>
+            <a:r>
+              <a:rPr lang="en-US" altLang="ko-KR" sz="1400" b="1" dirty="0" err="1"/>
+              <a:t>Div</a:t>
+            </a:r>
+            <a:endParaRPr lang="en-US" altLang="ko-KR" sz="1400" b="1" dirty="0"/>
+          </a:p>
+          <a:p>
+            <a:r>
+              <a:rPr lang="en-US" altLang="ko-KR" sz="1400" b="1" dirty="0"/>
+              <a:t>.footer-cols</a:t>
+            </a:r>
+            <a:endParaRPr lang="ko-KR" altLang="en-US" sz="1400" b="1" dirty="0"/>
+          </a:p>
+        </p:txBody>
+      </p:sp>
+      <p:cxnSp>
+        <p:nvCxnSpPr>
+          <p:cNvPr id="16" name="직선 화살표 연결선 15">
+            <a:extLst>
+              <a:ext uri="{FF2B5EF4-FFF2-40B4-BE49-F238E27FC236}">
+                <a16:creationId xmlns:a16="http://schemas.microsoft.com/office/drawing/2014/main" id="{104C7DF4-1B21-4378-871A-DCECB4D83DF2}"/>
+              </a:ext>
+            </a:extLst>
+          </p:cNvPr>
+          <p:cNvCxnSpPr>
+            <a:cxnSpLocks/>
+          </p:cNvCxnSpPr>
+          <p:nvPr/>
+        </p:nvCxnSpPr>
+        <p:spPr>
+          <a:xfrm>
+            <a:off x="10177670" y="3044964"/>
+            <a:ext cx="0" cy="1208984"/>
+          </a:xfrm>
+          <a:prstGeom prst="straightConnector1">
+            <a:avLst/>
+          </a:prstGeom>
+          <a:ln>
+            <a:headEnd type="triangle"/>
+            <a:tailEnd type="triangle"/>
+          </a:ln>
+        </p:spPr>
+        <p:style>
+          <a:lnRef idx="1">
+            <a:schemeClr val="accent2"/>
+          </a:lnRef>
+          <a:fillRef idx="0">
+            <a:schemeClr val="accent2"/>
+          </a:fillRef>
+          <a:effectRef idx="0">
+            <a:schemeClr val="accent2"/>
+          </a:effectRef>
+          <a:fontRef idx="minor">
+            <a:schemeClr val="tx1"/>
+          </a:fontRef>
+        </p:style>
+      </p:cxnSp>
+      <p:cxnSp>
+        <p:nvCxnSpPr>
+          <p:cNvPr id="19" name="직선 연결선 18">
+            <a:extLst>
+              <a:ext uri="{FF2B5EF4-FFF2-40B4-BE49-F238E27FC236}">
+                <a16:creationId xmlns:a16="http://schemas.microsoft.com/office/drawing/2014/main" id="{C11B8C22-A40E-4D04-88CB-7976377854BE}"/>
+              </a:ext>
+            </a:extLst>
+          </p:cNvPr>
+          <p:cNvCxnSpPr>
+            <a:endCxn id="14" idx="1"/>
+          </p:cNvCxnSpPr>
+          <p:nvPr/>
+        </p:nvCxnSpPr>
+        <p:spPr>
+          <a:xfrm>
+            <a:off x="10177670" y="3429000"/>
+            <a:ext cx="454446" cy="0"/>
+          </a:xfrm>
+          <a:prstGeom prst="line">
+            <a:avLst/>
+          </a:prstGeom>
+          <a:ln/>
+        </p:spPr>
+        <p:style>
+          <a:lnRef idx="1">
+            <a:schemeClr val="accent2"/>
+          </a:lnRef>
+          <a:fillRef idx="0">
+            <a:schemeClr val="accent2"/>
+          </a:fillRef>
+          <a:effectRef idx="0">
+            <a:schemeClr val="accent2"/>
+          </a:effectRef>
+          <a:fontRef idx="minor">
+            <a:schemeClr val="tx1"/>
+          </a:fontRef>
+        </p:style>
+      </p:cxnSp>
+    </p:spTree>
+    <p:extLst>
+      <p:ext uri="{BB962C8B-B14F-4D97-AF65-F5344CB8AC3E}">
+        <p14:creationId xmlns:p14="http://schemas.microsoft.com/office/powerpoint/2010/main" val="1580628176"/>
+      </p:ext>
+    </p:extLst>
+  </p:cSld>
+  <p:clrMapOvr>
+    <a:masterClrMapping/>
+  </p:clrMapOvr>
+</p:sld>
+</file>
+
 <file path=ppt/theme/theme1.xml><?xml version="1.0" encoding="utf-8"?>
 <a:theme xmlns:a="http://schemas.openxmlformats.org/drawingml/2006/main" name="Office 테마">
   <a:themeElements>

</xml_diff>